<commit_message>
working on control flow
</commit_message>
<xml_diff>
--- a/Slides/6. Control Flow/Control Flow.pptx
+++ b/Slides/6. Control Flow/Control Flow.pptx
@@ -5,7 +5,7 @@
     <p:sldMasterId id="2147483648" r:id="rId4"/>
   </p:sldMasterIdLst>
   <p:notesMasterIdLst>
-    <p:notesMasterId r:id="rId20"/>
+    <p:notesMasterId r:id="rId28"/>
   </p:notesMasterIdLst>
   <p:sldIdLst>
     <p:sldId id="257" r:id="rId5"/>
@@ -23,6 +23,14 @@
     <p:sldId id="346" r:id="rId17"/>
     <p:sldId id="347" r:id="rId18"/>
     <p:sldId id="348" r:id="rId19"/>
+    <p:sldId id="349" r:id="rId20"/>
+    <p:sldId id="350" r:id="rId21"/>
+    <p:sldId id="351" r:id="rId22"/>
+    <p:sldId id="352" r:id="rId23"/>
+    <p:sldId id="353" r:id="rId24"/>
+    <p:sldId id="354" r:id="rId25"/>
+    <p:sldId id="355" r:id="rId26"/>
+    <p:sldId id="356" r:id="rId27"/>
   </p:sldIdLst>
   <p:sldSz cx="12192000" cy="6858000"/>
   <p:notesSz cx="6858000" cy="9144000"/>
@@ -211,7 +219,7 @@
           <a:p>
             <a:fld id="{F032D6BB-809E-48C6-BD08-F9C24CEF57E6}" type="datetimeFigureOut">
               <a:rPr lang="en-US" smtClean="0"/>
-              <a:t>6/5/2023</a:t>
+              <a:t>6/6/2023</a:t>
             </a:fld>
             <a:endParaRPr lang="en-US"/>
           </a:p>
@@ -729,7 +737,7 @@
           <a:p>
             <a:fld id="{6D9868DE-73B6-4FC1-959F-CCDE785984CA}" type="datetimeFigureOut">
               <a:rPr lang="en-US" smtClean="0"/>
-              <a:t>6/5/2023</a:t>
+              <a:t>6/6/2023</a:t>
             </a:fld>
             <a:endParaRPr lang="en-US"/>
           </a:p>
@@ -927,7 +935,7 @@
           <a:p>
             <a:fld id="{6D9868DE-73B6-4FC1-959F-CCDE785984CA}" type="datetimeFigureOut">
               <a:rPr lang="en-US" smtClean="0"/>
-              <a:t>6/5/2023</a:t>
+              <a:t>6/6/2023</a:t>
             </a:fld>
             <a:endParaRPr lang="en-US"/>
           </a:p>
@@ -1135,7 +1143,7 @@
           <a:p>
             <a:fld id="{6D9868DE-73B6-4FC1-959F-CCDE785984CA}" type="datetimeFigureOut">
               <a:rPr lang="en-US" smtClean="0"/>
-              <a:t>6/5/2023</a:t>
+              <a:t>6/6/2023</a:t>
             </a:fld>
             <a:endParaRPr lang="en-US"/>
           </a:p>
@@ -2002,7 +2010,7 @@
           <a:p>
             <a:fld id="{6D9868DE-73B6-4FC1-959F-CCDE785984CA}" type="datetimeFigureOut">
               <a:rPr lang="en-US" smtClean="0"/>
-              <a:t>6/5/2023</a:t>
+              <a:t>6/6/2023</a:t>
             </a:fld>
             <a:endParaRPr lang="en-US"/>
           </a:p>
@@ -2277,7 +2285,7 @@
           <a:p>
             <a:fld id="{6D9868DE-73B6-4FC1-959F-CCDE785984CA}" type="datetimeFigureOut">
               <a:rPr lang="en-US" smtClean="0"/>
-              <a:t>6/5/2023</a:t>
+              <a:t>6/6/2023</a:t>
             </a:fld>
             <a:endParaRPr lang="en-US"/>
           </a:p>
@@ -2542,7 +2550,7 @@
           <a:p>
             <a:fld id="{6D9868DE-73B6-4FC1-959F-CCDE785984CA}" type="datetimeFigureOut">
               <a:rPr lang="en-US" smtClean="0"/>
-              <a:t>6/5/2023</a:t>
+              <a:t>6/6/2023</a:t>
             </a:fld>
             <a:endParaRPr lang="en-US"/>
           </a:p>
@@ -2954,7 +2962,7 @@
           <a:p>
             <a:fld id="{6D9868DE-73B6-4FC1-959F-CCDE785984CA}" type="datetimeFigureOut">
               <a:rPr lang="en-US" smtClean="0"/>
-              <a:t>6/5/2023</a:t>
+              <a:t>6/6/2023</a:t>
             </a:fld>
             <a:endParaRPr lang="en-US"/>
           </a:p>
@@ -3095,7 +3103,7 @@
           <a:p>
             <a:fld id="{6D9868DE-73B6-4FC1-959F-CCDE785984CA}" type="datetimeFigureOut">
               <a:rPr lang="en-US" smtClean="0"/>
-              <a:t>6/5/2023</a:t>
+              <a:t>6/6/2023</a:t>
             </a:fld>
             <a:endParaRPr lang="en-US"/>
           </a:p>
@@ -3208,7 +3216,7 @@
           <a:p>
             <a:fld id="{6D9868DE-73B6-4FC1-959F-CCDE785984CA}" type="datetimeFigureOut">
               <a:rPr lang="en-US" smtClean="0"/>
-              <a:t>6/5/2023</a:t>
+              <a:t>6/6/2023</a:t>
             </a:fld>
             <a:endParaRPr lang="en-US"/>
           </a:p>
@@ -3519,7 +3527,7 @@
           <a:p>
             <a:fld id="{6D9868DE-73B6-4FC1-959F-CCDE785984CA}" type="datetimeFigureOut">
               <a:rPr lang="en-US" smtClean="0"/>
-              <a:t>6/5/2023</a:t>
+              <a:t>6/6/2023</a:t>
             </a:fld>
             <a:endParaRPr lang="en-US"/>
           </a:p>
@@ -3807,7 +3815,7 @@
           <a:p>
             <a:fld id="{6D9868DE-73B6-4FC1-959F-CCDE785984CA}" type="datetimeFigureOut">
               <a:rPr lang="en-US" smtClean="0"/>
-              <a:t>6/5/2023</a:t>
+              <a:t>6/6/2023</a:t>
             </a:fld>
             <a:endParaRPr lang="en-US"/>
           </a:p>
@@ -4048,7 +4056,7 @@
           <a:p>
             <a:fld id="{6D9868DE-73B6-4FC1-959F-CCDE785984CA}" type="datetimeFigureOut">
               <a:rPr lang="en-US" smtClean="0"/>
-              <a:t>6/5/2023</a:t>
+              <a:t>6/6/2023</a:t>
             </a:fld>
             <a:endParaRPr lang="en-US"/>
           </a:p>
@@ -27558,35 +27566,41 @@
           <a:lstStyle/>
           <a:p>
             <a:r>
-              <a:rPr lang="en-US" sz="2400" dirty="0"/>
+              <a:rPr lang="en-US" sz="2000" dirty="0"/>
               <a:t>A while loop is used for executing a statement repeatedly until a given condition returns false. Here, statements may be a single statement or a block of statements</a:t>
             </a:r>
           </a:p>
           <a:p>
-            <a:endParaRPr lang="en-US" sz="2400" dirty="0"/>
+            <a:endParaRPr lang="en-US" sz="2000" dirty="0"/>
           </a:p>
           <a:p>
             <a:pPr marL="152396" indent="0">
               <a:buNone/>
             </a:pPr>
-            <a:endParaRPr lang="en-US" sz="2400" dirty="0"/>
+            <a:endParaRPr lang="en-US" sz="2000" dirty="0"/>
           </a:p>
           <a:p>
-            <a:endParaRPr lang="en-US" sz="2400" dirty="0"/>
+            <a:endParaRPr lang="en-US" sz="2000" dirty="0"/>
           </a:p>
           <a:p>
-            <a:endParaRPr lang="en-US" sz="2400" dirty="0"/>
+            <a:endParaRPr lang="en-US" sz="2000" dirty="0"/>
           </a:p>
           <a:p>
             <a:r>
-              <a:rPr lang="en-US" sz="2400" dirty="0"/>
+              <a:rPr lang="en-US" sz="2000" dirty="0"/>
               <a:t>While we are working with a while loop first, we need to check the condition, if the condition is true then the control will pass within the body and if the condition is false the control will pass outside the body.</a:t>
             </a:r>
           </a:p>
           <a:p>
             <a:r>
-              <a:rPr lang="en-US" sz="2400" dirty="0"/>
+              <a:rPr lang="en-US" sz="2000" dirty="0"/>
               <a:t>While we are working with a while loop first, we need to check the condition, if the condition is true then the control will pass within the body and if the condition is false the control will pass outside the body.</a:t>
+            </a:r>
+          </a:p>
+          <a:p>
+            <a:r>
+              <a:rPr lang="en-US" sz="2000" dirty="0"/>
+              <a:t>While loop is an example of an entry-controlled loop because in the while loop before executing the body first condition is evaluated if the condition is true then the body will be executed otherwise the body will be skipped.</a:t>
             </a:r>
           </a:p>
         </p:txBody>
@@ -27875,12 +27889,20 @@
             <p:ph type="title"/>
           </p:nvPr>
         </p:nvSpPr>
-        <p:spPr/>
+        <p:spPr>
+          <a:xfrm>
+            <a:off x="609599" y="298298"/>
+            <a:ext cx="7540101" cy="755003"/>
+          </a:xfrm>
+        </p:spPr>
         <p:txBody>
           <a:bodyPr/>
           <a:lstStyle/>
           <a:p>
-            <a:endParaRPr lang="en-US"/>
+            <a:r>
+              <a:rPr lang="en-US" dirty="0"/>
+              <a:t>Do-While Loop</a:t>
+            </a:r>
           </a:p>
         </p:txBody>
       </p:sp>
@@ -27900,19 +27922,537 @@
             <p:ph type="body" idx="1"/>
           </p:nvPr>
         </p:nvSpPr>
-        <p:spPr/>
+        <p:spPr>
+          <a:xfrm>
+            <a:off x="435007" y="861133"/>
+            <a:ext cx="11469948" cy="5566299"/>
+          </a:xfrm>
+        </p:spPr>
         <p:txBody>
           <a:bodyPr/>
           <a:lstStyle/>
           <a:p>
-            <a:endParaRPr lang="en-US"/>
+            <a:r>
+              <a:rPr lang="en-US" sz="2400" dirty="0"/>
+              <a:t>The do-while loop is a post-tested loop or exit-controlled loop i.e. first it will execute the loop body and then it will be going to test the condition. That means we need to use the do-while loop where we need to execute the loop body at least once</a:t>
+            </a:r>
+          </a:p>
+          <a:p>
+            <a:endParaRPr lang="en-US" sz="2400" dirty="0"/>
+          </a:p>
+          <a:p>
+            <a:endParaRPr lang="en-US" sz="2400" dirty="0"/>
+          </a:p>
+          <a:p>
+            <a:pPr marL="152396" indent="0">
+              <a:buNone/>
+            </a:pPr>
+            <a:endParaRPr lang="en-US" sz="2400" dirty="0"/>
+          </a:p>
+          <a:p>
+            <a:r>
+              <a:rPr lang="en-US" sz="2400" dirty="0"/>
+              <a:t>The difference between the do-while loop and the while loop in C# is that the do-while evaluates its test condition at the bottom of the loop whereas the while loop evaluates its test condition at the top. Therefore, the statements written inside the do-while block are executed at least once whereas we cannot give a guarantee that the statements written inside the while loop are going to be executed at least once.</a:t>
+            </a:r>
           </a:p>
         </p:txBody>
       </p:sp>
+      <p:pic>
+        <p:nvPicPr>
+          <p:cNvPr id="5" name="Picture 4">
+            <a:extLst>
+              <a:ext uri="{FF2B5EF4-FFF2-40B4-BE49-F238E27FC236}">
+                <a16:creationId xmlns:a16="http://schemas.microsoft.com/office/drawing/2014/main" id="{008E2F93-EEC7-08B4-024E-08FADB02F97F}"/>
+              </a:ext>
+            </a:extLst>
+          </p:cNvPr>
+          <p:cNvPicPr>
+            <a:picLocks noChangeAspect="1"/>
+          </p:cNvPicPr>
+          <p:nvPr/>
+        </p:nvPicPr>
+        <p:blipFill rotWithShape="1">
+          <a:blip r:embed="rId2"/>
+          <a:srcRect t="1941"/>
+          <a:stretch/>
+        </p:blipFill>
+        <p:spPr>
+          <a:xfrm>
+            <a:off x="4195346" y="2061778"/>
+            <a:ext cx="2114550" cy="1167521"/>
+          </a:xfrm>
+          <a:prstGeom prst="rect">
+            <a:avLst/>
+          </a:prstGeom>
+        </p:spPr>
+      </p:pic>
     </p:spTree>
     <p:extLst>
       <p:ext uri="{BB962C8B-B14F-4D97-AF65-F5344CB8AC3E}">
         <p14:creationId xmlns:p14="http://schemas.microsoft.com/office/powerpoint/2010/main" val="666768937"/>
+      </p:ext>
+    </p:extLst>
+  </p:cSld>
+  <p:clrMapOvr>
+    <a:masterClrMapping/>
+  </p:clrMapOvr>
+</p:sld>
+</file>
+
+<file path=ppt/slides/slide16.xml><?xml version="1.0" encoding="utf-8"?>
+<p:sld xmlns:a="http://schemas.openxmlformats.org/drawingml/2006/main" xmlns:r="http://schemas.openxmlformats.org/officeDocument/2006/relationships" xmlns:p="http://schemas.openxmlformats.org/presentationml/2006/main">
+  <p:cSld>
+    <p:spTree>
+      <p:nvGrpSpPr>
+        <p:cNvPr id="1" name=""/>
+        <p:cNvGrpSpPr/>
+        <p:nvPr/>
+      </p:nvGrpSpPr>
+      <p:grpSpPr>
+        <a:xfrm>
+          <a:off x="0" y="0"/>
+          <a:ext cx="0" cy="0"/>
+          <a:chOff x="0" y="0"/>
+          <a:chExt cx="0" cy="0"/>
+        </a:xfrm>
+      </p:grpSpPr>
+      <p:pic>
+        <p:nvPicPr>
+          <p:cNvPr id="5" name="Picture 4">
+            <a:extLst>
+              <a:ext uri="{FF2B5EF4-FFF2-40B4-BE49-F238E27FC236}">
+                <a16:creationId xmlns:a16="http://schemas.microsoft.com/office/drawing/2014/main" id="{BD529551-4555-FA31-639D-C96B980B7EA9}"/>
+              </a:ext>
+            </a:extLst>
+          </p:cNvPr>
+          <p:cNvPicPr>
+            <a:picLocks noChangeAspect="1"/>
+          </p:cNvPicPr>
+          <p:nvPr/>
+        </p:nvPicPr>
+        <p:blipFill>
+          <a:blip r:embed="rId2"/>
+          <a:stretch>
+            <a:fillRect/>
+          </a:stretch>
+        </p:blipFill>
+        <p:spPr>
+          <a:xfrm>
+            <a:off x="1818350" y="1222482"/>
+            <a:ext cx="8058150" cy="4714875"/>
+          </a:xfrm>
+          <a:prstGeom prst="rect">
+            <a:avLst/>
+          </a:prstGeom>
+        </p:spPr>
+      </p:pic>
+    </p:spTree>
+    <p:extLst>
+      <p:ext uri="{BB962C8B-B14F-4D97-AF65-F5344CB8AC3E}">
+        <p14:creationId xmlns:p14="http://schemas.microsoft.com/office/powerpoint/2010/main" val="2343166270"/>
+      </p:ext>
+    </p:extLst>
+  </p:cSld>
+  <p:clrMapOvr>
+    <a:masterClrMapping/>
+  </p:clrMapOvr>
+</p:sld>
+</file>
+
+<file path=ppt/slides/slide17.xml><?xml version="1.0" encoding="utf-8"?>
+<p:sld xmlns:a="http://schemas.openxmlformats.org/drawingml/2006/main" xmlns:r="http://schemas.openxmlformats.org/officeDocument/2006/relationships" xmlns:p="http://schemas.openxmlformats.org/presentationml/2006/main">
+  <p:cSld>
+    <p:spTree>
+      <p:nvGrpSpPr>
+        <p:cNvPr id="1" name=""/>
+        <p:cNvGrpSpPr/>
+        <p:nvPr/>
+      </p:nvGrpSpPr>
+      <p:grpSpPr>
+        <a:xfrm>
+          <a:off x="0" y="0"/>
+          <a:ext cx="0" cy="0"/>
+          <a:chOff x="0" y="0"/>
+          <a:chExt cx="0" cy="0"/>
+        </a:xfrm>
+      </p:grpSpPr>
+      <p:pic>
+        <p:nvPicPr>
+          <p:cNvPr id="5" name="Picture 4">
+            <a:extLst>
+              <a:ext uri="{FF2B5EF4-FFF2-40B4-BE49-F238E27FC236}">
+                <a16:creationId xmlns:a16="http://schemas.microsoft.com/office/drawing/2014/main" id="{51DF92E5-59BF-2D72-0931-0CC36B8F970D}"/>
+              </a:ext>
+            </a:extLst>
+          </p:cNvPr>
+          <p:cNvPicPr>
+            <a:picLocks noChangeAspect="1"/>
+          </p:cNvPicPr>
+          <p:nvPr/>
+        </p:nvPicPr>
+        <p:blipFill>
+          <a:blip r:embed="rId2"/>
+          <a:stretch>
+            <a:fillRect/>
+          </a:stretch>
+        </p:blipFill>
+        <p:spPr>
+          <a:xfrm>
+            <a:off x="1643479" y="957077"/>
+            <a:ext cx="3863164" cy="1830511"/>
+          </a:xfrm>
+          <a:prstGeom prst="rect">
+            <a:avLst/>
+          </a:prstGeom>
+        </p:spPr>
+      </p:pic>
+    </p:spTree>
+    <p:extLst>
+      <p:ext uri="{BB962C8B-B14F-4D97-AF65-F5344CB8AC3E}">
+        <p14:creationId xmlns:p14="http://schemas.microsoft.com/office/powerpoint/2010/main" val="867001736"/>
+      </p:ext>
+    </p:extLst>
+  </p:cSld>
+  <p:clrMapOvr>
+    <a:masterClrMapping/>
+  </p:clrMapOvr>
+</p:sld>
+</file>
+
+<file path=ppt/slides/slide18.xml><?xml version="1.0" encoding="utf-8"?>
+<p:sld xmlns:a="http://schemas.openxmlformats.org/drawingml/2006/main" xmlns:r="http://schemas.openxmlformats.org/officeDocument/2006/relationships" xmlns:p="http://schemas.openxmlformats.org/presentationml/2006/main">
+  <p:cSld>
+    <p:spTree>
+      <p:nvGrpSpPr>
+        <p:cNvPr id="1" name=""/>
+        <p:cNvGrpSpPr/>
+        <p:nvPr/>
+      </p:nvGrpSpPr>
+      <p:grpSpPr>
+        <a:xfrm>
+          <a:off x="0" y="0"/>
+          <a:ext cx="0" cy="0"/>
+          <a:chOff x="0" y="0"/>
+          <a:chExt cx="0" cy="0"/>
+        </a:xfrm>
+      </p:grpSpPr>
+      <p:sp>
+        <p:nvSpPr>
+          <p:cNvPr id="2" name="Title 1">
+            <a:extLst>
+              <a:ext uri="{FF2B5EF4-FFF2-40B4-BE49-F238E27FC236}">
+                <a16:creationId xmlns:a16="http://schemas.microsoft.com/office/drawing/2014/main" id="{BE25C41D-1E1F-2681-71DC-449169CC9744}"/>
+              </a:ext>
+            </a:extLst>
+          </p:cNvPr>
+          <p:cNvSpPr>
+            <a:spLocks noGrp="1"/>
+          </p:cNvSpPr>
+          <p:nvPr>
+            <p:ph type="title"/>
+          </p:nvPr>
+        </p:nvSpPr>
+        <p:spPr>
+          <a:xfrm>
+            <a:off x="804909" y="387075"/>
+            <a:ext cx="10354322" cy="577450"/>
+          </a:xfrm>
+        </p:spPr>
+        <p:txBody>
+          <a:bodyPr/>
+          <a:lstStyle/>
+          <a:p>
+            <a:r>
+              <a:rPr lang="en-US" dirty="0"/>
+              <a:t>For Loop</a:t>
+            </a:r>
+          </a:p>
+        </p:txBody>
+      </p:sp>
+      <p:sp>
+        <p:nvSpPr>
+          <p:cNvPr id="3" name="Text Placeholder 2">
+            <a:extLst>
+              <a:ext uri="{FF2B5EF4-FFF2-40B4-BE49-F238E27FC236}">
+                <a16:creationId xmlns:a16="http://schemas.microsoft.com/office/drawing/2014/main" id="{DC17A24D-2024-AD65-F84A-DFD0F4370CA1}"/>
+              </a:ext>
+            </a:extLst>
+          </p:cNvPr>
+          <p:cNvSpPr>
+            <a:spLocks noGrp="1"/>
+          </p:cNvSpPr>
+          <p:nvPr>
+            <p:ph type="body" idx="1"/>
+          </p:nvPr>
+        </p:nvSpPr>
+        <p:spPr>
+          <a:xfrm>
+            <a:off x="609599" y="1242874"/>
+            <a:ext cx="11410765" cy="4939326"/>
+          </a:xfrm>
+        </p:spPr>
+        <p:txBody>
+          <a:bodyPr/>
+          <a:lstStyle/>
+          <a:p>
+            <a:r>
+              <a:rPr lang="en-US" dirty="0"/>
+              <a:t>For loop is one of the most commonly used loops in the C# language. If we know the number of times, we want to execute some set of statements or instructions, then we should use for loop. For loop is known as a Counter loop. </a:t>
+            </a:r>
+          </a:p>
+        </p:txBody>
+      </p:sp>
+      <p:pic>
+        <p:nvPicPr>
+          <p:cNvPr id="5" name="Picture 4">
+            <a:extLst>
+              <a:ext uri="{FF2B5EF4-FFF2-40B4-BE49-F238E27FC236}">
+                <a16:creationId xmlns:a16="http://schemas.microsoft.com/office/drawing/2014/main" id="{61F24EC1-569D-F5E5-CCB1-F8542BF5F9B4}"/>
+              </a:ext>
+            </a:extLst>
+          </p:cNvPr>
+          <p:cNvPicPr>
+            <a:picLocks noChangeAspect="1"/>
+          </p:cNvPicPr>
+          <p:nvPr/>
+        </p:nvPicPr>
+        <p:blipFill>
+          <a:blip r:embed="rId2"/>
+          <a:stretch>
+            <a:fillRect/>
+          </a:stretch>
+        </p:blipFill>
+        <p:spPr>
+          <a:xfrm>
+            <a:off x="4341412" y="2475484"/>
+            <a:ext cx="3509176" cy="3851535"/>
+          </a:xfrm>
+          <a:prstGeom prst="rect">
+            <a:avLst/>
+          </a:prstGeom>
+        </p:spPr>
+      </p:pic>
+    </p:spTree>
+    <p:extLst>
+      <p:ext uri="{BB962C8B-B14F-4D97-AF65-F5344CB8AC3E}">
+        <p14:creationId xmlns:p14="http://schemas.microsoft.com/office/powerpoint/2010/main" val="1369087669"/>
+      </p:ext>
+    </p:extLst>
+  </p:cSld>
+  <p:clrMapOvr>
+    <a:masterClrMapping/>
+  </p:clrMapOvr>
+</p:sld>
+</file>
+
+<file path=ppt/slides/slide19.xml><?xml version="1.0" encoding="utf-8"?>
+<p:sld xmlns:a="http://schemas.openxmlformats.org/drawingml/2006/main" xmlns:r="http://schemas.openxmlformats.org/officeDocument/2006/relationships" xmlns:p="http://schemas.openxmlformats.org/presentationml/2006/main">
+  <p:cSld>
+    <p:spTree>
+      <p:nvGrpSpPr>
+        <p:cNvPr id="1" name=""/>
+        <p:cNvGrpSpPr/>
+        <p:nvPr/>
+      </p:nvGrpSpPr>
+      <p:grpSpPr>
+        <a:xfrm>
+          <a:off x="0" y="0"/>
+          <a:ext cx="0" cy="0"/>
+          <a:chOff x="0" y="0"/>
+          <a:chExt cx="0" cy="0"/>
+        </a:xfrm>
+      </p:grpSpPr>
+      <p:sp>
+        <p:nvSpPr>
+          <p:cNvPr id="2" name="Title 1">
+            <a:extLst>
+              <a:ext uri="{FF2B5EF4-FFF2-40B4-BE49-F238E27FC236}">
+                <a16:creationId xmlns:a16="http://schemas.microsoft.com/office/drawing/2014/main" id="{353C570E-B1D2-46F5-3A7A-C414D203B4EA}"/>
+              </a:ext>
+            </a:extLst>
+          </p:cNvPr>
+          <p:cNvSpPr>
+            <a:spLocks noGrp="1"/>
+          </p:cNvSpPr>
+          <p:nvPr>
+            <p:ph type="title"/>
+          </p:nvPr>
+        </p:nvSpPr>
+        <p:spPr>
+          <a:xfrm>
+            <a:off x="671744" y="391715"/>
+            <a:ext cx="7859697" cy="648471"/>
+          </a:xfrm>
+        </p:spPr>
+        <p:txBody>
+          <a:bodyPr/>
+          <a:lstStyle/>
+          <a:p>
+            <a:r>
+              <a:rPr lang="en-US" dirty="0"/>
+              <a:t>For Loop Stages</a:t>
+            </a:r>
+          </a:p>
+        </p:txBody>
+      </p:sp>
+      <p:sp>
+        <p:nvSpPr>
+          <p:cNvPr id="3" name="Text Placeholder 2">
+            <a:extLst>
+              <a:ext uri="{FF2B5EF4-FFF2-40B4-BE49-F238E27FC236}">
+                <a16:creationId xmlns:a16="http://schemas.microsoft.com/office/drawing/2014/main" id="{617D668C-9938-CEDE-145C-EDE225DC57CC}"/>
+              </a:ext>
+            </a:extLst>
+          </p:cNvPr>
+          <p:cNvSpPr>
+            <a:spLocks noGrp="1"/>
+          </p:cNvSpPr>
+          <p:nvPr>
+            <p:ph type="body" idx="1"/>
+          </p:nvPr>
+        </p:nvSpPr>
+        <p:spPr>
+          <a:xfrm>
+            <a:off x="537099" y="1094527"/>
+            <a:ext cx="11117802" cy="5371758"/>
+          </a:xfrm>
+        </p:spPr>
+        <p:txBody>
+          <a:bodyPr/>
+          <a:lstStyle/>
+          <a:p>
+            <a:r>
+              <a:rPr lang="en-US" sz="2400" dirty="0"/>
+              <a:t>Loop initialization</a:t>
+            </a:r>
+          </a:p>
+          <a:p>
+            <a:r>
+              <a:rPr lang="en-US" sz="2400" dirty="0"/>
+              <a:t>Condition evaluation</a:t>
+            </a:r>
+          </a:p>
+          <a:p>
+            <a:r>
+              <a:rPr lang="en-US" sz="2400" dirty="0"/>
+              <a:t>Execution of instruction</a:t>
+            </a:r>
+          </a:p>
+          <a:p>
+            <a:r>
+              <a:rPr lang="en-US" sz="2400" dirty="0"/>
+              <a:t>Increment/Decrement</a:t>
+            </a:r>
+          </a:p>
+          <a:p>
+            <a:pPr marL="152396" indent="0">
+              <a:buNone/>
+            </a:pPr>
+            <a:endParaRPr lang="en-US" sz="2400" dirty="0"/>
+          </a:p>
+          <a:p>
+            <a:pPr marL="152396" indent="0">
+              <a:buNone/>
+            </a:pPr>
+            <a:r>
+              <a:rPr lang="en-US" sz="2000" b="1" dirty="0"/>
+              <a:t>Loop Initialization: </a:t>
+            </a:r>
+            <a:r>
+              <a:rPr lang="en-US" sz="2000" dirty="0"/>
+              <a:t>Loop initialization happens only once while executing the for loop, which means that the initialization part of for loop only executes once. Here, initialization means we need to initialize the counter variable.</a:t>
+            </a:r>
+          </a:p>
+          <a:p>
+            <a:pPr marL="152396" indent="0">
+              <a:buNone/>
+            </a:pPr>
+            <a:r>
+              <a:rPr lang="en-US" sz="2000" b="1" dirty="0"/>
+              <a:t>Condition Evaluation</a:t>
+            </a:r>
+            <a:r>
+              <a:rPr lang="en-US" sz="2000" dirty="0"/>
+              <a:t>: Conditions in for loop are executed for each iteration and if the condition is true, it executes the C# instruction and if the condition is false then it comes out of the loop.</a:t>
+            </a:r>
+          </a:p>
+          <a:p>
+            <a:pPr marL="152396" indent="0">
+              <a:buNone/>
+            </a:pPr>
+            <a:r>
+              <a:rPr lang="en-US" sz="2000" b="1" dirty="0"/>
+              <a:t>Execution of Instruction</a:t>
+            </a:r>
+            <a:r>
+              <a:rPr lang="en-US" sz="2000" dirty="0"/>
+              <a:t>: Once the condition is evaluated, and if the condition is true, then the control comes to the loop body i.e. the loop body is going to be executed.</a:t>
+            </a:r>
+          </a:p>
+          <a:p>
+            <a:pPr marL="152396" indent="0">
+              <a:buNone/>
+            </a:pPr>
+            <a:r>
+              <a:rPr lang="en-US" sz="2000" b="1" dirty="0"/>
+              <a:t>Increment/Decrement</a:t>
+            </a:r>
+            <a:r>
+              <a:rPr lang="en-US" sz="2000" dirty="0"/>
+              <a:t>: After executing the loop body, the increment/decrement part of the for loop will be executed, and once it executes the increment decrement part i.e. once it increments and decrements the counter variable, again it will go to the condition evaluation stage.</a:t>
+            </a:r>
+          </a:p>
+          <a:p>
+            <a:pPr marL="152396" indent="0">
+              <a:buNone/>
+            </a:pPr>
+            <a:endParaRPr lang="en-US" sz="2400" dirty="0"/>
+          </a:p>
+          <a:p>
+            <a:endParaRPr lang="en-US" dirty="0"/>
+          </a:p>
+          <a:p>
+            <a:pPr marL="152396" indent="0">
+              <a:buNone/>
+            </a:pPr>
+            <a:endParaRPr lang="en-US" dirty="0"/>
+          </a:p>
+        </p:txBody>
+      </p:sp>
+      <p:pic>
+        <p:nvPicPr>
+          <p:cNvPr id="7" name="Picture 6">
+            <a:extLst>
+              <a:ext uri="{FF2B5EF4-FFF2-40B4-BE49-F238E27FC236}">
+                <a16:creationId xmlns:a16="http://schemas.microsoft.com/office/drawing/2014/main" id="{5566CA17-469C-FE21-E9E2-68EE7BCD83C3}"/>
+              </a:ext>
+            </a:extLst>
+          </p:cNvPr>
+          <p:cNvPicPr>
+            <a:picLocks noChangeAspect="1"/>
+          </p:cNvPicPr>
+          <p:nvPr/>
+        </p:nvPicPr>
+        <p:blipFill>
+          <a:blip r:embed="rId2"/>
+          <a:stretch>
+            <a:fillRect/>
+          </a:stretch>
+        </p:blipFill>
+        <p:spPr>
+          <a:xfrm>
+            <a:off x="5164399" y="887413"/>
+            <a:ext cx="4686300" cy="1143000"/>
+          </a:xfrm>
+          <a:prstGeom prst="rect">
+            <a:avLst/>
+          </a:prstGeom>
+        </p:spPr>
+      </p:pic>
+    </p:spTree>
+    <p:extLst>
+      <p:ext uri="{BB962C8B-B14F-4D97-AF65-F5344CB8AC3E}">
+        <p14:creationId xmlns:p14="http://schemas.microsoft.com/office/powerpoint/2010/main" val="279999270"/>
       </p:ext>
     </p:extLst>
   </p:cSld>
@@ -28018,6 +28558,666 @@
     <p:extLst>
       <p:ext uri="{BB962C8B-B14F-4D97-AF65-F5344CB8AC3E}">
         <p14:creationId xmlns:p14="http://schemas.microsoft.com/office/powerpoint/2010/main" val="2041342528"/>
+      </p:ext>
+    </p:extLst>
+  </p:cSld>
+  <p:clrMapOvr>
+    <a:masterClrMapping/>
+  </p:clrMapOvr>
+</p:sld>
+</file>
+
+<file path=ppt/slides/slide20.xml><?xml version="1.0" encoding="utf-8"?>
+<p:sld xmlns:a="http://schemas.openxmlformats.org/drawingml/2006/main" xmlns:r="http://schemas.openxmlformats.org/officeDocument/2006/relationships" xmlns:p="http://schemas.openxmlformats.org/presentationml/2006/main">
+  <p:cSld>
+    <p:spTree>
+      <p:nvGrpSpPr>
+        <p:cNvPr id="1" name=""/>
+        <p:cNvGrpSpPr/>
+        <p:nvPr/>
+      </p:nvGrpSpPr>
+      <p:grpSpPr>
+        <a:xfrm>
+          <a:off x="0" y="0"/>
+          <a:ext cx="0" cy="0"/>
+          <a:chOff x="0" y="0"/>
+          <a:chExt cx="0" cy="0"/>
+        </a:xfrm>
+      </p:grpSpPr>
+      <p:pic>
+        <p:nvPicPr>
+          <p:cNvPr id="5" name="Picture 4">
+            <a:extLst>
+              <a:ext uri="{FF2B5EF4-FFF2-40B4-BE49-F238E27FC236}">
+                <a16:creationId xmlns:a16="http://schemas.microsoft.com/office/drawing/2014/main" id="{CB0E1292-02A7-2B35-278B-123AA2A67955}"/>
+              </a:ext>
+            </a:extLst>
+          </p:cNvPr>
+          <p:cNvPicPr>
+            <a:picLocks noChangeAspect="1"/>
+          </p:cNvPicPr>
+          <p:nvPr/>
+        </p:nvPicPr>
+        <p:blipFill>
+          <a:blip r:embed="rId2"/>
+          <a:stretch>
+            <a:fillRect/>
+          </a:stretch>
+        </p:blipFill>
+        <p:spPr>
+          <a:xfrm>
+            <a:off x="1752322" y="652830"/>
+            <a:ext cx="4514850" cy="1362075"/>
+          </a:xfrm>
+          <a:prstGeom prst="rect">
+            <a:avLst/>
+          </a:prstGeom>
+        </p:spPr>
+      </p:pic>
+      <p:pic>
+        <p:nvPicPr>
+          <p:cNvPr id="9" name="Picture 8">
+            <a:extLst>
+              <a:ext uri="{FF2B5EF4-FFF2-40B4-BE49-F238E27FC236}">
+                <a16:creationId xmlns:a16="http://schemas.microsoft.com/office/drawing/2014/main" id="{E4A64F5B-1022-4282-F909-2C19D6C733B5}"/>
+              </a:ext>
+            </a:extLst>
+          </p:cNvPr>
+          <p:cNvPicPr>
+            <a:picLocks noChangeAspect="1"/>
+          </p:cNvPicPr>
+          <p:nvPr/>
+        </p:nvPicPr>
+        <p:blipFill>
+          <a:blip r:embed="rId3"/>
+          <a:stretch>
+            <a:fillRect/>
+          </a:stretch>
+        </p:blipFill>
+        <p:spPr>
+          <a:xfrm>
+            <a:off x="1752322" y="2403489"/>
+            <a:ext cx="4535801" cy="1626972"/>
+          </a:xfrm>
+          <a:prstGeom prst="rect">
+            <a:avLst/>
+          </a:prstGeom>
+        </p:spPr>
+      </p:pic>
+      <p:pic>
+        <p:nvPicPr>
+          <p:cNvPr id="11" name="Picture 10">
+            <a:extLst>
+              <a:ext uri="{FF2B5EF4-FFF2-40B4-BE49-F238E27FC236}">
+                <a16:creationId xmlns:a16="http://schemas.microsoft.com/office/drawing/2014/main" id="{906B4FCB-A486-E593-289D-475A58E28128}"/>
+              </a:ext>
+            </a:extLst>
+          </p:cNvPr>
+          <p:cNvPicPr>
+            <a:picLocks noChangeAspect="1"/>
+          </p:cNvPicPr>
+          <p:nvPr/>
+        </p:nvPicPr>
+        <p:blipFill rotWithShape="1">
+          <a:blip r:embed="rId4"/>
+          <a:srcRect/>
+          <a:stretch/>
+        </p:blipFill>
+        <p:spPr>
+          <a:xfrm>
+            <a:off x="7109209" y="2569275"/>
+            <a:ext cx="3105150" cy="1295400"/>
+          </a:xfrm>
+          <a:prstGeom prst="rect">
+            <a:avLst/>
+          </a:prstGeom>
+        </p:spPr>
+      </p:pic>
+      <p:pic>
+        <p:nvPicPr>
+          <p:cNvPr id="13" name="Picture 12">
+            <a:extLst>
+              <a:ext uri="{FF2B5EF4-FFF2-40B4-BE49-F238E27FC236}">
+                <a16:creationId xmlns:a16="http://schemas.microsoft.com/office/drawing/2014/main" id="{565385F8-D656-887C-C1A4-D30B716C16E9}"/>
+              </a:ext>
+            </a:extLst>
+          </p:cNvPr>
+          <p:cNvPicPr>
+            <a:picLocks noChangeAspect="1"/>
+          </p:cNvPicPr>
+          <p:nvPr/>
+        </p:nvPicPr>
+        <p:blipFill>
+          <a:blip r:embed="rId5"/>
+          <a:stretch>
+            <a:fillRect/>
+          </a:stretch>
+        </p:blipFill>
+        <p:spPr>
+          <a:xfrm>
+            <a:off x="1752322" y="4394631"/>
+            <a:ext cx="4514850" cy="2089843"/>
+          </a:xfrm>
+          <a:prstGeom prst="rect">
+            <a:avLst/>
+          </a:prstGeom>
+        </p:spPr>
+      </p:pic>
+      <p:pic>
+        <p:nvPicPr>
+          <p:cNvPr id="14" name="Picture 13">
+            <a:extLst>
+              <a:ext uri="{FF2B5EF4-FFF2-40B4-BE49-F238E27FC236}">
+                <a16:creationId xmlns:a16="http://schemas.microsoft.com/office/drawing/2014/main" id="{CA45CB5F-7E1B-2649-5B56-63B2D1478E8B}"/>
+              </a:ext>
+            </a:extLst>
+          </p:cNvPr>
+          <p:cNvPicPr>
+            <a:picLocks noChangeAspect="1"/>
+          </p:cNvPicPr>
+          <p:nvPr/>
+        </p:nvPicPr>
+        <p:blipFill rotWithShape="1">
+          <a:blip r:embed="rId4"/>
+          <a:srcRect/>
+          <a:stretch/>
+        </p:blipFill>
+        <p:spPr>
+          <a:xfrm>
+            <a:off x="7109209" y="4791852"/>
+            <a:ext cx="3105150" cy="1295400"/>
+          </a:xfrm>
+          <a:prstGeom prst="rect">
+            <a:avLst/>
+          </a:prstGeom>
+        </p:spPr>
+      </p:pic>
+      <p:pic>
+        <p:nvPicPr>
+          <p:cNvPr id="15" name="Picture 14">
+            <a:extLst>
+              <a:ext uri="{FF2B5EF4-FFF2-40B4-BE49-F238E27FC236}">
+                <a16:creationId xmlns:a16="http://schemas.microsoft.com/office/drawing/2014/main" id="{30FD9361-B384-8A94-B331-784286A4DDC9}"/>
+              </a:ext>
+            </a:extLst>
+          </p:cNvPr>
+          <p:cNvPicPr>
+            <a:picLocks noChangeAspect="1"/>
+          </p:cNvPicPr>
+          <p:nvPr/>
+        </p:nvPicPr>
+        <p:blipFill rotWithShape="1">
+          <a:blip r:embed="rId4"/>
+          <a:srcRect/>
+          <a:stretch/>
+        </p:blipFill>
+        <p:spPr>
+          <a:xfrm>
+            <a:off x="6971742" y="686167"/>
+            <a:ext cx="3105150" cy="1295400"/>
+          </a:xfrm>
+          <a:prstGeom prst="rect">
+            <a:avLst/>
+          </a:prstGeom>
+        </p:spPr>
+      </p:pic>
+    </p:spTree>
+    <p:extLst>
+      <p:ext uri="{BB962C8B-B14F-4D97-AF65-F5344CB8AC3E}">
+        <p14:creationId xmlns:p14="http://schemas.microsoft.com/office/powerpoint/2010/main" val="2024441010"/>
+      </p:ext>
+    </p:extLst>
+  </p:cSld>
+  <p:clrMapOvr>
+    <a:masterClrMapping/>
+  </p:clrMapOvr>
+</p:sld>
+</file>
+
+<file path=ppt/slides/slide21.xml><?xml version="1.0" encoding="utf-8"?>
+<p:sld xmlns:a="http://schemas.openxmlformats.org/drawingml/2006/main" xmlns:r="http://schemas.openxmlformats.org/officeDocument/2006/relationships" xmlns:p="http://schemas.openxmlformats.org/presentationml/2006/main">
+  <p:cSld>
+    <p:spTree>
+      <p:nvGrpSpPr>
+        <p:cNvPr id="1" name=""/>
+        <p:cNvGrpSpPr/>
+        <p:nvPr/>
+      </p:nvGrpSpPr>
+      <p:grpSpPr>
+        <a:xfrm>
+          <a:off x="0" y="0"/>
+          <a:ext cx="0" cy="0"/>
+          <a:chOff x="0" y="0"/>
+          <a:chExt cx="0" cy="0"/>
+        </a:xfrm>
+      </p:grpSpPr>
+      <p:sp>
+        <p:nvSpPr>
+          <p:cNvPr id="2" name="Title 1">
+            <a:extLst>
+              <a:ext uri="{FF2B5EF4-FFF2-40B4-BE49-F238E27FC236}">
+                <a16:creationId xmlns:a16="http://schemas.microsoft.com/office/drawing/2014/main" id="{B9B42738-CC4B-3340-3FFB-D8B6E3F3F32E}"/>
+              </a:ext>
+            </a:extLst>
+          </p:cNvPr>
+          <p:cNvSpPr>
+            <a:spLocks noGrp="1"/>
+          </p:cNvSpPr>
+          <p:nvPr>
+            <p:ph type="title"/>
+          </p:nvPr>
+        </p:nvSpPr>
+        <p:spPr/>
+        <p:txBody>
+          <a:bodyPr/>
+          <a:lstStyle/>
+          <a:p>
+            <a:r>
+              <a:rPr lang="en-US" dirty="0"/>
+              <a:t>Jump Statements </a:t>
+            </a:r>
+          </a:p>
+        </p:txBody>
+      </p:sp>
+      <p:sp>
+        <p:nvSpPr>
+          <p:cNvPr id="3" name="Text Placeholder 2">
+            <a:extLst>
+              <a:ext uri="{FF2B5EF4-FFF2-40B4-BE49-F238E27FC236}">
+                <a16:creationId xmlns:a16="http://schemas.microsoft.com/office/drawing/2014/main" id="{FBC71889-EB3F-B0A5-0287-ADEB995454F2}"/>
+              </a:ext>
+            </a:extLst>
+          </p:cNvPr>
+          <p:cNvSpPr>
+            <a:spLocks noGrp="1"/>
+          </p:cNvSpPr>
+          <p:nvPr>
+            <p:ph type="body" idx="1"/>
+          </p:nvPr>
+        </p:nvSpPr>
+        <p:spPr>
+          <a:xfrm>
+            <a:off x="609599" y="2015231"/>
+            <a:ext cx="10487487" cy="4166969"/>
+          </a:xfrm>
+        </p:spPr>
+        <p:txBody>
+          <a:bodyPr/>
+          <a:lstStyle/>
+          <a:p>
+            <a:pPr marL="152396" indent="0">
+              <a:buNone/>
+            </a:pPr>
+            <a:r>
+              <a:rPr lang="en-US" dirty="0"/>
+              <a:t>Jump statement are used to transfer control from one point or location to another point or location. They are used to modify the behavior of conditional and iterative statements .</a:t>
+            </a:r>
+          </a:p>
+          <a:p>
+            <a:pPr marL="152396" indent="0">
+              <a:buNone/>
+            </a:pPr>
+            <a:r>
+              <a:rPr lang="en-US" dirty="0"/>
+              <a:t>They include:</a:t>
+            </a:r>
+          </a:p>
+          <a:p>
+            <a:r>
+              <a:rPr lang="en-US" dirty="0"/>
+              <a:t>Break</a:t>
+            </a:r>
+          </a:p>
+          <a:p>
+            <a:r>
+              <a:rPr lang="en-US" dirty="0"/>
+              <a:t>Continue</a:t>
+            </a:r>
+          </a:p>
+          <a:p>
+            <a:r>
+              <a:rPr lang="en-US" dirty="0"/>
+              <a:t>Goto</a:t>
+            </a:r>
+          </a:p>
+          <a:p>
+            <a:r>
+              <a:rPr lang="en-US" dirty="0"/>
+              <a:t>Return </a:t>
+            </a:r>
+          </a:p>
+          <a:p>
+            <a:r>
+              <a:rPr lang="en-US" dirty="0"/>
+              <a:t>throw</a:t>
+            </a:r>
+          </a:p>
+        </p:txBody>
+      </p:sp>
+    </p:spTree>
+    <p:extLst>
+      <p:ext uri="{BB962C8B-B14F-4D97-AF65-F5344CB8AC3E}">
+        <p14:creationId xmlns:p14="http://schemas.microsoft.com/office/powerpoint/2010/main" val="2582121551"/>
+      </p:ext>
+    </p:extLst>
+  </p:cSld>
+  <p:clrMapOvr>
+    <a:masterClrMapping/>
+  </p:clrMapOvr>
+</p:sld>
+</file>
+
+<file path=ppt/slides/slide22.xml><?xml version="1.0" encoding="utf-8"?>
+<p:sld xmlns:a="http://schemas.openxmlformats.org/drawingml/2006/main" xmlns:r="http://schemas.openxmlformats.org/officeDocument/2006/relationships" xmlns:p="http://schemas.openxmlformats.org/presentationml/2006/main">
+  <p:cSld>
+    <p:spTree>
+      <p:nvGrpSpPr>
+        <p:cNvPr id="1" name=""/>
+        <p:cNvGrpSpPr/>
+        <p:nvPr/>
+      </p:nvGrpSpPr>
+      <p:grpSpPr>
+        <a:xfrm>
+          <a:off x="0" y="0"/>
+          <a:ext cx="0" cy="0"/>
+          <a:chOff x="0" y="0"/>
+          <a:chExt cx="0" cy="0"/>
+        </a:xfrm>
+      </p:grpSpPr>
+      <p:sp>
+        <p:nvSpPr>
+          <p:cNvPr id="2" name="Title 1">
+            <a:extLst>
+              <a:ext uri="{FF2B5EF4-FFF2-40B4-BE49-F238E27FC236}">
+                <a16:creationId xmlns:a16="http://schemas.microsoft.com/office/drawing/2014/main" id="{08194DA8-D77F-055C-1652-A24253755FD2}"/>
+              </a:ext>
+            </a:extLst>
+          </p:cNvPr>
+          <p:cNvSpPr>
+            <a:spLocks noGrp="1"/>
+          </p:cNvSpPr>
+          <p:nvPr>
+            <p:ph type="title"/>
+          </p:nvPr>
+        </p:nvSpPr>
+        <p:spPr>
+          <a:xfrm>
+            <a:off x="609600" y="203786"/>
+            <a:ext cx="8276948" cy="692859"/>
+          </a:xfrm>
+        </p:spPr>
+        <p:txBody>
+          <a:bodyPr/>
+          <a:lstStyle/>
+          <a:p>
+            <a:r>
+              <a:rPr lang="en-US" dirty="0"/>
+              <a:t>Break Statement</a:t>
+            </a:r>
+          </a:p>
+        </p:txBody>
+      </p:sp>
+      <p:sp>
+        <p:nvSpPr>
+          <p:cNvPr id="3" name="Text Placeholder 2">
+            <a:extLst>
+              <a:ext uri="{FF2B5EF4-FFF2-40B4-BE49-F238E27FC236}">
+                <a16:creationId xmlns:a16="http://schemas.microsoft.com/office/drawing/2014/main" id="{A5A21D9B-4641-A0D0-82B9-E8C64ACB0366}"/>
+              </a:ext>
+            </a:extLst>
+          </p:cNvPr>
+          <p:cNvSpPr>
+            <a:spLocks noGrp="1"/>
+          </p:cNvSpPr>
+          <p:nvPr>
+            <p:ph type="body" idx="1"/>
+          </p:nvPr>
+        </p:nvSpPr>
+        <p:spPr>
+          <a:xfrm>
+            <a:off x="519676" y="1118587"/>
+            <a:ext cx="11349767" cy="5285555"/>
+          </a:xfrm>
+        </p:spPr>
+        <p:txBody>
+          <a:bodyPr/>
+          <a:lstStyle/>
+          <a:p>
+            <a:r>
+              <a:rPr lang="en-US" dirty="0"/>
+              <a:t>Break is a keyword that is used to terminate the loop body or the switch body. In a switch  each case should be terminated by a break statement to terminate the switch block.</a:t>
+            </a:r>
+          </a:p>
+          <a:p>
+            <a:endParaRPr lang="en-US" dirty="0"/>
+          </a:p>
+        </p:txBody>
+      </p:sp>
+      <p:pic>
+        <p:nvPicPr>
+          <p:cNvPr id="5" name="Picture 4">
+            <a:extLst>
+              <a:ext uri="{FF2B5EF4-FFF2-40B4-BE49-F238E27FC236}">
+                <a16:creationId xmlns:a16="http://schemas.microsoft.com/office/drawing/2014/main" id="{C603989D-DABD-1F1F-524F-D4DBBE81BFCC}"/>
+              </a:ext>
+            </a:extLst>
+          </p:cNvPr>
+          <p:cNvPicPr>
+            <a:picLocks noChangeAspect="1"/>
+          </p:cNvPicPr>
+          <p:nvPr/>
+        </p:nvPicPr>
+        <p:blipFill>
+          <a:blip r:embed="rId2"/>
+          <a:stretch>
+            <a:fillRect/>
+          </a:stretch>
+        </p:blipFill>
+        <p:spPr>
+          <a:xfrm>
+            <a:off x="7594977" y="2308194"/>
+            <a:ext cx="4274466" cy="3767474"/>
+          </a:xfrm>
+          <a:prstGeom prst="rect">
+            <a:avLst/>
+          </a:prstGeom>
+        </p:spPr>
+      </p:pic>
+      <p:pic>
+        <p:nvPicPr>
+          <p:cNvPr id="7" name="Picture 6">
+            <a:extLst>
+              <a:ext uri="{FF2B5EF4-FFF2-40B4-BE49-F238E27FC236}">
+                <a16:creationId xmlns:a16="http://schemas.microsoft.com/office/drawing/2014/main" id="{CD6CD83A-3E68-DBFE-BD10-DDCC0AE547E1}"/>
+              </a:ext>
+            </a:extLst>
+          </p:cNvPr>
+          <p:cNvPicPr>
+            <a:picLocks noChangeAspect="1"/>
+          </p:cNvPicPr>
+          <p:nvPr/>
+        </p:nvPicPr>
+        <p:blipFill rotWithShape="1">
+          <a:blip r:embed="rId3"/>
+          <a:srcRect t="3767"/>
+          <a:stretch/>
+        </p:blipFill>
+        <p:spPr>
+          <a:xfrm>
+            <a:off x="231853" y="3563546"/>
+            <a:ext cx="7491377" cy="2175867"/>
+          </a:xfrm>
+          <a:prstGeom prst="rect">
+            <a:avLst/>
+          </a:prstGeom>
+        </p:spPr>
+      </p:pic>
+    </p:spTree>
+    <p:extLst>
+      <p:ext uri="{BB962C8B-B14F-4D97-AF65-F5344CB8AC3E}">
+        <p14:creationId xmlns:p14="http://schemas.microsoft.com/office/powerpoint/2010/main" val="3932354794"/>
+      </p:ext>
+    </p:extLst>
+  </p:cSld>
+  <p:clrMapOvr>
+    <a:masterClrMapping/>
+  </p:clrMapOvr>
+</p:sld>
+</file>
+
+<file path=ppt/slides/slide23.xml><?xml version="1.0" encoding="utf-8"?>
+<p:sld xmlns:a="http://schemas.openxmlformats.org/drawingml/2006/main" xmlns:r="http://schemas.openxmlformats.org/officeDocument/2006/relationships" xmlns:p="http://schemas.openxmlformats.org/presentationml/2006/main">
+  <p:cSld>
+    <p:spTree>
+      <p:nvGrpSpPr>
+        <p:cNvPr id="1" name=""/>
+        <p:cNvGrpSpPr/>
+        <p:nvPr/>
+      </p:nvGrpSpPr>
+      <p:grpSpPr>
+        <a:xfrm>
+          <a:off x="0" y="0"/>
+          <a:ext cx="0" cy="0"/>
+          <a:chOff x="0" y="0"/>
+          <a:chExt cx="0" cy="0"/>
+        </a:xfrm>
+      </p:grpSpPr>
+      <p:sp>
+        <p:nvSpPr>
+          <p:cNvPr id="2" name="Title 1">
+            <a:extLst>
+              <a:ext uri="{FF2B5EF4-FFF2-40B4-BE49-F238E27FC236}">
+                <a16:creationId xmlns:a16="http://schemas.microsoft.com/office/drawing/2014/main" id="{CA4A4FE0-96DC-58DD-6811-80A511E240B1}"/>
+              </a:ext>
+            </a:extLst>
+          </p:cNvPr>
+          <p:cNvSpPr>
+            <a:spLocks noGrp="1"/>
+          </p:cNvSpPr>
+          <p:nvPr>
+            <p:ph type="title"/>
+          </p:nvPr>
+        </p:nvSpPr>
+        <p:spPr>
+          <a:xfrm>
+            <a:off x="725010" y="168275"/>
+            <a:ext cx="8197048" cy="595205"/>
+          </a:xfrm>
+        </p:spPr>
+        <p:txBody>
+          <a:bodyPr/>
+          <a:lstStyle/>
+          <a:p>
+            <a:r>
+              <a:rPr lang="en-US" dirty="0"/>
+              <a:t>Continue Statement</a:t>
+            </a:r>
+          </a:p>
+        </p:txBody>
+      </p:sp>
+      <p:sp>
+        <p:nvSpPr>
+          <p:cNvPr id="3" name="Text Placeholder 2">
+            <a:extLst>
+              <a:ext uri="{FF2B5EF4-FFF2-40B4-BE49-F238E27FC236}">
+                <a16:creationId xmlns:a16="http://schemas.microsoft.com/office/drawing/2014/main" id="{3C0603C5-F1C3-56C5-3BE9-A1A049BC70BF}"/>
+              </a:ext>
+            </a:extLst>
+          </p:cNvPr>
+          <p:cNvSpPr>
+            <a:spLocks noGrp="1"/>
+          </p:cNvSpPr>
+          <p:nvPr>
+            <p:ph type="body" idx="1"/>
+          </p:nvPr>
+        </p:nvSpPr>
+        <p:spPr>
+          <a:xfrm>
+            <a:off x="609599" y="843379"/>
+            <a:ext cx="11295355" cy="5690586"/>
+          </a:xfrm>
+        </p:spPr>
+        <p:txBody>
+          <a:bodyPr/>
+          <a:lstStyle/>
+          <a:p>
+            <a:r>
+              <a:rPr lang="en-US" sz="2400" dirty="0"/>
+              <a:t>Sometimes we need to skip the statement execution from the loop body and we </a:t>
+            </a:r>
+          </a:p>
+          <a:p>
+            <a:r>
+              <a:rPr lang="en-US" sz="2400" dirty="0"/>
+              <a:t>The BREAK statement terminates the loop, whereas the CONTINUE statement skips only the current loop iteration, and allows the next loop iteration to proceed. The continue statement is almost always used with the if…else statement need to continue the loop execution for the next iteration.</a:t>
+            </a:r>
+          </a:p>
+        </p:txBody>
+      </p:sp>
+      <p:pic>
+        <p:nvPicPr>
+          <p:cNvPr id="5" name="Picture 4">
+            <a:extLst>
+              <a:ext uri="{FF2B5EF4-FFF2-40B4-BE49-F238E27FC236}">
+                <a16:creationId xmlns:a16="http://schemas.microsoft.com/office/drawing/2014/main" id="{4285073F-3BD7-634E-C6D3-6CF79E0D8357}"/>
+              </a:ext>
+            </a:extLst>
+          </p:cNvPr>
+          <p:cNvPicPr>
+            <a:picLocks noChangeAspect="1"/>
+          </p:cNvPicPr>
+          <p:nvPr/>
+        </p:nvPicPr>
+        <p:blipFill>
+          <a:blip r:embed="rId2"/>
+          <a:stretch>
+            <a:fillRect/>
+          </a:stretch>
+        </p:blipFill>
+        <p:spPr>
+          <a:xfrm>
+            <a:off x="8175687" y="2651529"/>
+            <a:ext cx="4016313" cy="3445903"/>
+          </a:xfrm>
+          <a:prstGeom prst="rect">
+            <a:avLst/>
+          </a:prstGeom>
+        </p:spPr>
+      </p:pic>
+      <p:pic>
+        <p:nvPicPr>
+          <p:cNvPr id="7" name="Picture 6">
+            <a:extLst>
+              <a:ext uri="{FF2B5EF4-FFF2-40B4-BE49-F238E27FC236}">
+                <a16:creationId xmlns:a16="http://schemas.microsoft.com/office/drawing/2014/main" id="{2887C8D8-0E6A-E945-FE7B-305EE82B7AF4}"/>
+              </a:ext>
+            </a:extLst>
+          </p:cNvPr>
+          <p:cNvPicPr>
+            <a:picLocks noChangeAspect="1"/>
+          </p:cNvPicPr>
+          <p:nvPr/>
+        </p:nvPicPr>
+        <p:blipFill>
+          <a:blip r:embed="rId3"/>
+          <a:stretch>
+            <a:fillRect/>
+          </a:stretch>
+        </p:blipFill>
+        <p:spPr>
+          <a:xfrm>
+            <a:off x="426128" y="3665948"/>
+            <a:ext cx="7669283" cy="2271685"/>
+          </a:xfrm>
+          <a:prstGeom prst="rect">
+            <a:avLst/>
+          </a:prstGeom>
+        </p:spPr>
+      </p:pic>
+    </p:spTree>
+    <p:extLst>
+      <p:ext uri="{BB962C8B-B14F-4D97-AF65-F5344CB8AC3E}">
+        <p14:creationId xmlns:p14="http://schemas.microsoft.com/office/powerpoint/2010/main" val="2784801660"/>
       </p:ext>
     </p:extLst>
   </p:cSld>
@@ -29355,15 +30555,6 @@
 </file>
 
 <file path=customXml/item1.xml><?xml version="1.0" encoding="utf-8"?>
-<?mso-contentType ?>
-<FormTemplates xmlns="http://schemas.microsoft.com/sharepoint/v3/contenttype/forms">
-  <Display>DocumentLibraryForm</Display>
-  <Edit>DocumentLibraryForm</Edit>
-  <New>DocumentLibraryForm</New>
-</FormTemplates>
-</file>
-
-<file path=customXml/item2.xml><?xml version="1.0" encoding="utf-8"?>
 <ct:contentTypeSchema xmlns:ct="http://schemas.microsoft.com/office/2006/metadata/contentType" xmlns:ma="http://schemas.microsoft.com/office/2006/metadata/properties/metaAttributes" ct:_="" ma:_="" ma:contentTypeName="Document" ma:contentTypeID="0x0101006A3FE9166DFFCA4F828C9562480FADF8" ma:contentTypeVersion="17" ma:contentTypeDescription="Create a new document." ma:contentTypeScope="" ma:versionID="99b97478d634bcb6731d6423c0aa6266">
   <xsd:schema xmlns:xsd="http://www.w3.org/2001/XMLSchema" xmlns:xs="http://www.w3.org/2001/XMLSchema" xmlns:p="http://schemas.microsoft.com/office/2006/metadata/properties" xmlns:ns3="b2463319-f063-494d-be28-0864aafcbfaf" xmlns:ns4="cb70dd5e-aeba-4303-895e-0ae485ba4d8f" targetNamespace="http://schemas.microsoft.com/office/2006/metadata/properties" ma:root="true" ma:fieldsID="145e044a657221f1d5675606702a2248" ns3:_="" ns4:_="">
     <xsd:import namespace="b2463319-f063-494d-be28-0864aafcbfaf"/>
@@ -29610,6 +30801,15 @@
 </ct:contentTypeSchema>
 </file>
 
+<file path=customXml/item2.xml><?xml version="1.0" encoding="utf-8"?>
+<?mso-contentType ?>
+<FormTemplates xmlns="http://schemas.microsoft.com/sharepoint/v3/contenttype/forms">
+  <Display>DocumentLibraryForm</Display>
+  <Edit>DocumentLibraryForm</Edit>
+  <New>DocumentLibraryForm</New>
+</FormTemplates>
+</file>
+
 <file path=customXml/item3.xml><?xml version="1.0" encoding="utf-8"?>
 <p:properties xmlns:p="http://schemas.microsoft.com/office/2006/metadata/properties" xmlns:xsi="http://www.w3.org/2001/XMLSchema-instance" xmlns:pc="http://schemas.microsoft.com/office/infopath/2007/PartnerControls">
   <documentManagement>
@@ -29622,14 +30822,6 @@
 </file>
 
 <file path=customXml/itemProps1.xml><?xml version="1.0" encoding="utf-8"?>
-<ds:datastoreItem xmlns:ds="http://schemas.openxmlformats.org/officeDocument/2006/customXml" ds:itemID="{3DA09E55-07E3-4B96-80C1-B81AA4C2395D}">
-  <ds:schemaRefs>
-    <ds:schemaRef ds:uri="http://schemas.microsoft.com/sharepoint/v3/contenttype/forms"/>
-  </ds:schemaRefs>
-</ds:datastoreItem>
-</file>
-
-<file path=customXml/itemProps2.xml><?xml version="1.0" encoding="utf-8"?>
 <ds:datastoreItem xmlns:ds="http://schemas.openxmlformats.org/officeDocument/2006/customXml" ds:itemID="{D1D7B4EB-F5C5-4CA3-BAC1-B3B4AF6DB5F3}">
   <ds:schemaRefs>
     <ds:schemaRef ds:uri="http://schemas.microsoft.com/office/2006/metadata/contentType"/>
@@ -29644,6 +30836,14 @@
     <ds:schemaRef ds:uri="http://purl.org/dc/elements/1.1/"/>
     <ds:schemaRef ds:uri="http://purl.org/dc/terms/"/>
     <ds:schemaRef ds:uri="http://schemas.microsoft.com/internal/obd"/>
+  </ds:schemaRefs>
+</ds:datastoreItem>
+</file>
+
+<file path=customXml/itemProps2.xml><?xml version="1.0" encoding="utf-8"?>
+<ds:datastoreItem xmlns:ds="http://schemas.openxmlformats.org/officeDocument/2006/customXml" ds:itemID="{3DA09E55-07E3-4B96-80C1-B81AA4C2395D}">
+  <ds:schemaRefs>
+    <ds:schemaRef ds:uri="http://schemas.microsoft.com/sharepoint/v3/contenttype/forms"/>
   </ds:schemaRefs>
 </ds:datastoreItem>
 </file>

</xml_diff>